<commit_message>
Fix UI explanation diagram
</commit_message>
<xml_diff>
--- a/docs/diagrams/MainWindowLayout.pptx
+++ b/docs/diagrams/MainWindowLayout.pptx
@@ -241,7 +241,7 @@
           <a:p>
             <a:fld id="{1BDFA6BF-14D6-A84C-BAFE-BD852D998A27}" type="datetimeFigureOut">
               <a:rPr lang="en-US" smtClean="0"/>
-              <a:t>3/16/2017</a:t>
+              <a:t>4/10/17</a:t>
             </a:fld>
             <a:endParaRPr lang="en-US"/>
           </a:p>
@@ -409,7 +409,7 @@
           <a:p>
             <a:fld id="{1BDFA6BF-14D6-A84C-BAFE-BD852D998A27}" type="datetimeFigureOut">
               <a:rPr lang="en-US" smtClean="0"/>
-              <a:t>3/16/2017</a:t>
+              <a:t>4/10/17</a:t>
             </a:fld>
             <a:endParaRPr lang="en-US"/>
           </a:p>
@@ -587,7 +587,7 @@
           <a:p>
             <a:fld id="{1BDFA6BF-14D6-A84C-BAFE-BD852D998A27}" type="datetimeFigureOut">
               <a:rPr lang="en-US" smtClean="0"/>
-              <a:t>3/16/2017</a:t>
+              <a:t>4/10/17</a:t>
             </a:fld>
             <a:endParaRPr lang="en-US"/>
           </a:p>
@@ -755,7 +755,7 @@
           <a:p>
             <a:fld id="{1BDFA6BF-14D6-A84C-BAFE-BD852D998A27}" type="datetimeFigureOut">
               <a:rPr lang="en-US" smtClean="0"/>
-              <a:t>3/16/2017</a:t>
+              <a:t>4/10/17</a:t>
             </a:fld>
             <a:endParaRPr lang="en-US"/>
           </a:p>
@@ -1000,7 +1000,7 @@
           <a:p>
             <a:fld id="{1BDFA6BF-14D6-A84C-BAFE-BD852D998A27}" type="datetimeFigureOut">
               <a:rPr lang="en-US" smtClean="0"/>
-              <a:t>3/16/2017</a:t>
+              <a:t>4/10/17</a:t>
             </a:fld>
             <a:endParaRPr lang="en-US"/>
           </a:p>
@@ -1229,7 +1229,7 @@
           <a:p>
             <a:fld id="{1BDFA6BF-14D6-A84C-BAFE-BD852D998A27}" type="datetimeFigureOut">
               <a:rPr lang="en-US" smtClean="0"/>
-              <a:t>3/16/2017</a:t>
+              <a:t>4/10/17</a:t>
             </a:fld>
             <a:endParaRPr lang="en-US"/>
           </a:p>
@@ -1593,7 +1593,7 @@
           <a:p>
             <a:fld id="{1BDFA6BF-14D6-A84C-BAFE-BD852D998A27}" type="datetimeFigureOut">
               <a:rPr lang="en-US" smtClean="0"/>
-              <a:t>3/16/2017</a:t>
+              <a:t>4/10/17</a:t>
             </a:fld>
             <a:endParaRPr lang="en-US"/>
           </a:p>
@@ -1710,7 +1710,7 @@
           <a:p>
             <a:fld id="{1BDFA6BF-14D6-A84C-BAFE-BD852D998A27}" type="datetimeFigureOut">
               <a:rPr lang="en-US" smtClean="0"/>
-              <a:t>3/16/2017</a:t>
+              <a:t>4/10/17</a:t>
             </a:fld>
             <a:endParaRPr lang="en-US"/>
           </a:p>
@@ -1805,7 +1805,7 @@
           <a:p>
             <a:fld id="{1BDFA6BF-14D6-A84C-BAFE-BD852D998A27}" type="datetimeFigureOut">
               <a:rPr lang="en-US" smtClean="0"/>
-              <a:t>3/16/2017</a:t>
+              <a:t>4/10/17</a:t>
             </a:fld>
             <a:endParaRPr lang="en-US"/>
           </a:p>
@@ -2080,7 +2080,7 @@
           <a:p>
             <a:fld id="{1BDFA6BF-14D6-A84C-BAFE-BD852D998A27}" type="datetimeFigureOut">
               <a:rPr lang="en-US" smtClean="0"/>
-              <a:t>3/16/2017</a:t>
+              <a:t>4/10/17</a:t>
             </a:fld>
             <a:endParaRPr lang="en-US"/>
           </a:p>
@@ -2332,7 +2332,7 @@
           <a:p>
             <a:fld id="{1BDFA6BF-14D6-A84C-BAFE-BD852D998A27}" type="datetimeFigureOut">
               <a:rPr lang="en-US" smtClean="0"/>
-              <a:t>3/16/2017</a:t>
+              <a:t>4/10/17</a:t>
             </a:fld>
             <a:endParaRPr lang="en-US"/>
           </a:p>
@@ -2543,7 +2543,7 @@
           <a:p>
             <a:fld id="{1BDFA6BF-14D6-A84C-BAFE-BD852D998A27}" type="datetimeFigureOut">
               <a:rPr lang="en-US" smtClean="0"/>
-              <a:t>3/16/2017</a:t>
+              <a:t>4/10/17</a:t>
             </a:fld>
             <a:endParaRPr lang="en-US"/>
           </a:p>
@@ -2948,404 +2948,379 @@
           <a:chExt cx="0" cy="0"/>
         </a:xfrm>
       </p:grpSpPr>
-      <p:grpSp>
-        <p:nvGrpSpPr>
-          <p:cNvPr id="7" name="Group 6"/>
-          <p:cNvGrpSpPr/>
+      <p:pic>
+        <p:nvPicPr>
+          <p:cNvPr id="2" name="Picture 1"/>
+          <p:cNvPicPr>
+            <a:picLocks noChangeAspect="1"/>
+          </p:cNvPicPr>
           <p:nvPr/>
-        </p:nvGrpSpPr>
-        <p:grpSpPr>
+        </p:nvPicPr>
+        <p:blipFill>
+          <a:blip r:embed="rId2">
+            <a:extLst>
+              <a:ext uri="{28A0092B-C50C-407E-A947-70E740481C1C}">
+                <a14:useLocalDpi xmlns:a14="http://schemas.microsoft.com/office/drawing/2010/main" val="0"/>
+              </a:ext>
+            </a:extLst>
+          </a:blip>
+          <a:stretch>
+            <a:fillRect/>
+          </a:stretch>
+        </p:blipFill>
+        <p:spPr>
           <a:xfrm>
-            <a:off x="1199457" y="30974"/>
-            <a:ext cx="9505056" cy="6771439"/>
-            <a:chOff x="2027237" y="620688"/>
-            <a:chExt cx="8677275" cy="6181725"/>
+            <a:off x="736600" y="-171400"/>
+            <a:ext cx="10399960" cy="7632848"/>
           </a:xfrm>
-        </p:grpSpPr>
-        <p:pic>
-          <p:nvPicPr>
-            <p:cNvPr id="4" name="Picture 3"/>
-            <p:cNvPicPr>
-              <a:picLocks noChangeAspect="1"/>
-            </p:cNvPicPr>
-            <p:nvPr/>
-          </p:nvPicPr>
-          <p:blipFill>
-            <a:blip r:embed="rId2">
-              <a:extLst>
-                <a:ext uri="{28A0092B-C50C-407E-A947-70E740481C1C}">
-                  <a14:useLocalDpi xmlns:a14="http://schemas.microsoft.com/office/drawing/2010/main" val="0"/>
-                </a:ext>
-              </a:extLst>
-            </a:blip>
-            <a:stretch>
-              <a:fillRect/>
-            </a:stretch>
-          </p:blipFill>
-          <p:spPr>
-            <a:xfrm>
-              <a:off x="2027237" y="620688"/>
-              <a:ext cx="8677275" cy="6181725"/>
-            </a:xfrm>
-            <a:prstGeom prst="rect">
-              <a:avLst/>
-            </a:prstGeom>
-          </p:spPr>
-        </p:pic>
-        <p:sp>
-          <p:nvSpPr>
-            <p:cNvPr id="5" name="Rounded Rectangle 4"/>
-            <p:cNvSpPr/>
-            <p:nvPr/>
-          </p:nvSpPr>
-          <p:spPr>
-            <a:xfrm>
-              <a:off x="2050156" y="1199208"/>
-              <a:ext cx="8568953" cy="504056"/>
-            </a:xfrm>
-            <a:prstGeom prst="roundRect">
-              <a:avLst/>
-            </a:prstGeom>
-            <a:solidFill>
-              <a:srgbClr val="00B050">
-                <a:alpha val="60000"/>
-              </a:srgbClr>
-            </a:solidFill>
-          </p:spPr>
-          <p:style>
-            <a:lnRef idx="2">
-              <a:schemeClr val="accent1">
-                <a:shade val="50000"/>
-              </a:schemeClr>
-            </a:lnRef>
-            <a:fillRef idx="1">
-              <a:schemeClr val="accent1"/>
-            </a:fillRef>
-            <a:effectRef idx="0">
-              <a:schemeClr val="accent1"/>
-            </a:effectRef>
-            <a:fontRef idx="minor">
-              <a:schemeClr val="lt1"/>
-            </a:fontRef>
-          </p:style>
-          <p:txBody>
-            <a:bodyPr rtlCol="0" anchor="ctr"/>
-            <a:lstStyle/>
-            <a:p>
-              <a:pPr algn="ctr"/>
-              <a:r>
-                <a:rPr lang="en-US" dirty="0" err="1">
-                  <a:solidFill>
-                    <a:schemeClr val="bg1"/>
-                  </a:solidFill>
-                </a:rPr>
-                <a:t>CommandBox</a:t>
-              </a:r>
-              <a:endParaRPr lang="en-US" dirty="0">
+          <a:prstGeom prst="rect">
+            <a:avLst/>
+          </a:prstGeom>
+        </p:spPr>
+      </p:pic>
+      <p:sp>
+        <p:nvSpPr>
+          <p:cNvPr id="5" name="Rounded Rectangle 4"/>
+          <p:cNvSpPr/>
+          <p:nvPr/>
+        </p:nvSpPr>
+        <p:spPr>
+          <a:xfrm>
+            <a:off x="1246104" y="572603"/>
+            <a:ext cx="9386400" cy="336117"/>
+          </a:xfrm>
+          <a:prstGeom prst="roundRect">
+            <a:avLst/>
+          </a:prstGeom>
+          <a:solidFill>
+            <a:srgbClr val="00B050">
+              <a:alpha val="60000"/>
+            </a:srgbClr>
+          </a:solidFill>
+        </p:spPr>
+        <p:style>
+          <a:lnRef idx="2">
+            <a:schemeClr val="accent1">
+              <a:shade val="50000"/>
+            </a:schemeClr>
+          </a:lnRef>
+          <a:fillRef idx="1">
+            <a:schemeClr val="accent1"/>
+          </a:fillRef>
+          <a:effectRef idx="0">
+            <a:schemeClr val="accent1"/>
+          </a:effectRef>
+          <a:fontRef idx="minor">
+            <a:schemeClr val="lt1"/>
+          </a:fontRef>
+        </p:style>
+        <p:txBody>
+          <a:bodyPr rtlCol="0" anchor="ctr"/>
+          <a:lstStyle/>
+          <a:p>
+            <a:pPr algn="ctr"/>
+            <a:r>
+              <a:rPr lang="en-US" dirty="0">
                 <a:solidFill>
                   <a:schemeClr val="bg1"/>
                 </a:solidFill>
-              </a:endParaRPr>
-            </a:p>
-          </p:txBody>
-        </p:sp>
-        <p:sp>
-          <p:nvSpPr>
-            <p:cNvPr id="6" name="Rounded Rectangle 5"/>
-            <p:cNvSpPr/>
-            <p:nvPr/>
-          </p:nvSpPr>
-          <p:spPr>
-            <a:xfrm>
-              <a:off x="2050157" y="1703263"/>
-              <a:ext cx="8568952" cy="935137"/>
-            </a:xfrm>
-            <a:prstGeom prst="roundRect">
-              <a:avLst>
-                <a:gd name="adj" fmla="val 8630"/>
-              </a:avLst>
-            </a:prstGeom>
-            <a:solidFill>
-              <a:srgbClr val="92D050">
-                <a:alpha val="60000"/>
-              </a:srgbClr>
-            </a:solidFill>
-          </p:spPr>
-          <p:style>
-            <a:lnRef idx="2">
-              <a:schemeClr val="accent1">
-                <a:shade val="50000"/>
-              </a:schemeClr>
-            </a:lnRef>
-            <a:fillRef idx="1">
-              <a:schemeClr val="accent1"/>
-            </a:fillRef>
-            <a:effectRef idx="0">
-              <a:schemeClr val="accent1"/>
-            </a:effectRef>
-            <a:fontRef idx="minor">
-              <a:schemeClr val="lt1"/>
-            </a:fontRef>
-          </p:style>
-          <p:txBody>
-            <a:bodyPr rtlCol="0" anchor="ctr"/>
-            <a:lstStyle/>
-            <a:p>
-              <a:pPr algn="ctr"/>
-              <a:r>
-                <a:rPr lang="en-US" dirty="0" err="1">
-                  <a:solidFill>
-                    <a:schemeClr val="bg1"/>
-                  </a:solidFill>
-                </a:rPr>
-                <a:t>ResultDisplay</a:t>
-              </a:r>
-              <a:endParaRPr lang="en-US" dirty="0">
+              </a:rPr>
+              <a:t>CommandBox</a:t>
+            </a:r>
+          </a:p>
+        </p:txBody>
+      </p:sp>
+      <p:sp>
+        <p:nvSpPr>
+          <p:cNvPr id="6" name="Rounded Rectangle 5"/>
+          <p:cNvSpPr/>
+          <p:nvPr/>
+        </p:nvSpPr>
+        <p:spPr>
+          <a:xfrm>
+            <a:off x="1224562" y="908720"/>
+            <a:ext cx="9386399" cy="864096"/>
+          </a:xfrm>
+          <a:prstGeom prst="roundRect">
+            <a:avLst>
+              <a:gd name="adj" fmla="val 8630"/>
+            </a:avLst>
+          </a:prstGeom>
+          <a:solidFill>
+            <a:srgbClr val="92D050">
+              <a:alpha val="60000"/>
+            </a:srgbClr>
+          </a:solidFill>
+        </p:spPr>
+        <p:style>
+          <a:lnRef idx="2">
+            <a:schemeClr val="accent1">
+              <a:shade val="50000"/>
+            </a:schemeClr>
+          </a:lnRef>
+          <a:fillRef idx="1">
+            <a:schemeClr val="accent1"/>
+          </a:fillRef>
+          <a:effectRef idx="0">
+            <a:schemeClr val="accent1"/>
+          </a:effectRef>
+          <a:fontRef idx="minor">
+            <a:schemeClr val="lt1"/>
+          </a:fontRef>
+        </p:style>
+        <p:txBody>
+          <a:bodyPr rtlCol="0" anchor="ctr"/>
+          <a:lstStyle/>
+          <a:p>
+            <a:pPr algn="ctr"/>
+            <a:r>
+              <a:rPr lang="en-US" dirty="0">
                 <a:solidFill>
                   <a:schemeClr val="bg1"/>
                 </a:solidFill>
-              </a:endParaRPr>
-            </a:p>
-          </p:txBody>
-        </p:sp>
-        <p:sp>
-          <p:nvSpPr>
-            <p:cNvPr id="10" name="Rounded Rectangle 9"/>
-            <p:cNvSpPr/>
-            <p:nvPr/>
-          </p:nvSpPr>
-          <p:spPr>
-            <a:xfrm>
-              <a:off x="2076597" y="2657113"/>
-              <a:ext cx="2781872" cy="3798679"/>
-            </a:xfrm>
-            <a:prstGeom prst="roundRect">
-              <a:avLst>
-                <a:gd name="adj" fmla="val 2531"/>
-              </a:avLst>
-            </a:prstGeom>
-            <a:solidFill>
-              <a:schemeClr val="accent6">
-                <a:lumMod val="75000"/>
-                <a:alpha val="60000"/>
-              </a:schemeClr>
-            </a:solidFill>
-          </p:spPr>
-          <p:style>
-            <a:lnRef idx="2">
-              <a:schemeClr val="accent1">
-                <a:shade val="50000"/>
-              </a:schemeClr>
-            </a:lnRef>
-            <a:fillRef idx="1">
-              <a:schemeClr val="accent1"/>
-            </a:fillRef>
-            <a:effectRef idx="0">
-              <a:schemeClr val="accent1"/>
-            </a:effectRef>
-            <a:fontRef idx="minor">
-              <a:schemeClr val="lt1"/>
-            </a:fontRef>
-          </p:style>
-          <p:txBody>
-            <a:bodyPr rtlCol="0" anchor="ctr"/>
-            <a:lstStyle/>
-            <a:p>
-              <a:pPr algn="ctr"/>
-              <a:r>
-                <a:rPr lang="en-US" dirty="0" err="1">
-                  <a:solidFill>
-                    <a:schemeClr val="bg1"/>
-                  </a:solidFill>
-                </a:rPr>
-                <a:t>TaskListPanel</a:t>
-              </a:r>
-              <a:endParaRPr lang="en-US" dirty="0">
+              </a:rPr>
+              <a:t>ResultDisplay</a:t>
+            </a:r>
+          </a:p>
+        </p:txBody>
+      </p:sp>
+      <p:sp>
+        <p:nvSpPr>
+          <p:cNvPr id="10" name="Rounded Rectangle 9"/>
+          <p:cNvSpPr/>
+          <p:nvPr/>
+        </p:nvSpPr>
+        <p:spPr>
+          <a:xfrm>
+            <a:off x="1253525" y="1851693"/>
+            <a:ext cx="2826251" cy="4571034"/>
+          </a:xfrm>
+          <a:prstGeom prst="roundRect">
+            <a:avLst>
+              <a:gd name="adj" fmla="val 2531"/>
+            </a:avLst>
+          </a:prstGeom>
+          <a:solidFill>
+            <a:schemeClr val="accent6">
+              <a:lumMod val="75000"/>
+              <a:alpha val="60000"/>
+            </a:schemeClr>
+          </a:solidFill>
+        </p:spPr>
+        <p:style>
+          <a:lnRef idx="2">
+            <a:schemeClr val="accent1">
+              <a:shade val="50000"/>
+            </a:schemeClr>
+          </a:lnRef>
+          <a:fillRef idx="1">
+            <a:schemeClr val="accent1"/>
+          </a:fillRef>
+          <a:effectRef idx="0">
+            <a:schemeClr val="accent1"/>
+          </a:effectRef>
+          <a:fontRef idx="minor">
+            <a:schemeClr val="lt1"/>
+          </a:fontRef>
+        </p:style>
+        <p:txBody>
+          <a:bodyPr rtlCol="0" anchor="ctr"/>
+          <a:lstStyle/>
+          <a:p>
+            <a:pPr algn="ctr"/>
+            <a:r>
+              <a:rPr lang="en-US" dirty="0" err="1">
                 <a:solidFill>
                   <a:schemeClr val="bg1"/>
                 </a:solidFill>
-              </a:endParaRPr>
-            </a:p>
-          </p:txBody>
-        </p:sp>
-        <p:sp>
-          <p:nvSpPr>
-            <p:cNvPr id="11" name="Rounded Rectangle 10"/>
-            <p:cNvSpPr/>
-            <p:nvPr/>
-          </p:nvSpPr>
-          <p:spPr>
-            <a:xfrm>
-              <a:off x="4930477" y="2657113"/>
-              <a:ext cx="2781872" cy="3798679"/>
-            </a:xfrm>
-            <a:prstGeom prst="roundRect">
-              <a:avLst>
-                <a:gd name="adj" fmla="val 2531"/>
-              </a:avLst>
-            </a:prstGeom>
-            <a:solidFill>
-              <a:schemeClr val="accent6">
-                <a:lumMod val="75000"/>
-                <a:alpha val="60000"/>
-              </a:schemeClr>
-            </a:solidFill>
-          </p:spPr>
-          <p:style>
-            <a:lnRef idx="2">
-              <a:schemeClr val="accent1">
-                <a:shade val="50000"/>
-              </a:schemeClr>
-            </a:lnRef>
-            <a:fillRef idx="1">
-              <a:schemeClr val="accent1"/>
-            </a:fillRef>
-            <a:effectRef idx="0">
-              <a:schemeClr val="accent1"/>
-            </a:effectRef>
-            <a:fontRef idx="minor">
-              <a:schemeClr val="lt1"/>
-            </a:fontRef>
-          </p:style>
-          <p:txBody>
-            <a:bodyPr rtlCol="0" anchor="ctr"/>
-            <a:lstStyle/>
-            <a:p>
-              <a:pPr algn="ctr"/>
-              <a:r>
-                <a:rPr lang="en-US" altLang="zh-CN" dirty="0" err="1">
-                  <a:solidFill>
-                    <a:schemeClr val="bg1"/>
-                  </a:solidFill>
-                </a:rPr>
-                <a:t>TaskListPanel</a:t>
-              </a:r>
-              <a:endParaRPr lang="en-US" dirty="0">
+              </a:rPr>
+              <a:t>TaskListPanel</a:t>
+            </a:r>
+            <a:endParaRPr lang="en-US" dirty="0">
+              <a:solidFill>
+                <a:schemeClr val="bg1"/>
+              </a:solidFill>
+            </a:endParaRPr>
+          </a:p>
+        </p:txBody>
+      </p:sp>
+      <p:sp>
+        <p:nvSpPr>
+          <p:cNvPr id="11" name="Rounded Rectangle 10"/>
+          <p:cNvSpPr/>
+          <p:nvPr/>
+        </p:nvSpPr>
+        <p:spPr>
+          <a:xfrm>
+            <a:off x="4295801" y="1844824"/>
+            <a:ext cx="2952328" cy="4577900"/>
+          </a:xfrm>
+          <a:prstGeom prst="roundRect">
+            <a:avLst>
+              <a:gd name="adj" fmla="val 2531"/>
+            </a:avLst>
+          </a:prstGeom>
+          <a:solidFill>
+            <a:schemeClr val="accent6">
+              <a:lumMod val="75000"/>
+              <a:alpha val="60000"/>
+            </a:schemeClr>
+          </a:solidFill>
+        </p:spPr>
+        <p:style>
+          <a:lnRef idx="2">
+            <a:schemeClr val="accent1">
+              <a:shade val="50000"/>
+            </a:schemeClr>
+          </a:lnRef>
+          <a:fillRef idx="1">
+            <a:schemeClr val="accent1"/>
+          </a:fillRef>
+          <a:effectRef idx="0">
+            <a:schemeClr val="accent1"/>
+          </a:effectRef>
+          <a:fontRef idx="minor">
+            <a:schemeClr val="lt1"/>
+          </a:fontRef>
+        </p:style>
+        <p:txBody>
+          <a:bodyPr rtlCol="0" anchor="ctr"/>
+          <a:lstStyle/>
+          <a:p>
+            <a:pPr algn="ctr"/>
+            <a:r>
+              <a:rPr lang="en-US" altLang="zh-CN" dirty="0" err="1">
                 <a:solidFill>
                   <a:schemeClr val="bg1"/>
                 </a:solidFill>
-              </a:endParaRPr>
-            </a:p>
-          </p:txBody>
-        </p:sp>
-        <p:sp>
-          <p:nvSpPr>
-            <p:cNvPr id="12" name="Rounded Rectangle 11"/>
-            <p:cNvSpPr/>
-            <p:nvPr/>
-          </p:nvSpPr>
-          <p:spPr>
-            <a:xfrm>
-              <a:off x="7756339" y="2657112"/>
-              <a:ext cx="2862769" cy="3798679"/>
-            </a:xfrm>
-            <a:prstGeom prst="roundRect">
-              <a:avLst>
-                <a:gd name="adj" fmla="val 2531"/>
-              </a:avLst>
-            </a:prstGeom>
-            <a:solidFill>
-              <a:schemeClr val="accent6">
-                <a:lumMod val="75000"/>
-                <a:alpha val="60000"/>
-              </a:schemeClr>
-            </a:solidFill>
-          </p:spPr>
-          <p:style>
-            <a:lnRef idx="2">
-              <a:schemeClr val="accent1">
-                <a:shade val="50000"/>
-              </a:schemeClr>
-            </a:lnRef>
-            <a:fillRef idx="1">
-              <a:schemeClr val="accent1"/>
-            </a:fillRef>
-            <a:effectRef idx="0">
-              <a:schemeClr val="accent1"/>
-            </a:effectRef>
-            <a:fontRef idx="minor">
-              <a:schemeClr val="lt1"/>
-            </a:fontRef>
-          </p:style>
-          <p:txBody>
-            <a:bodyPr rtlCol="0" anchor="ctr"/>
-            <a:lstStyle/>
-            <a:p>
-              <a:pPr algn="ctr"/>
-              <a:r>
-                <a:rPr lang="en-US" altLang="zh-CN" dirty="0" err="1">
-                  <a:solidFill>
-                    <a:schemeClr val="bg1"/>
-                  </a:solidFill>
-                </a:rPr>
-                <a:t>TaskListPanel</a:t>
-              </a:r>
-              <a:endParaRPr lang="en-US" dirty="0">
+              </a:rPr>
+              <a:t>TaskListPanel</a:t>
+            </a:r>
+            <a:endParaRPr lang="en-US" dirty="0">
+              <a:solidFill>
+                <a:schemeClr val="bg1"/>
+              </a:solidFill>
+            </a:endParaRPr>
+          </a:p>
+        </p:txBody>
+      </p:sp>
+      <p:sp>
+        <p:nvSpPr>
+          <p:cNvPr id="12" name="Rounded Rectangle 11"/>
+          <p:cNvSpPr/>
+          <p:nvPr/>
+        </p:nvSpPr>
+        <p:spPr>
+          <a:xfrm>
+            <a:off x="7392144" y="1844824"/>
+            <a:ext cx="3240360" cy="4577900"/>
+          </a:xfrm>
+          <a:prstGeom prst="roundRect">
+            <a:avLst>
+              <a:gd name="adj" fmla="val 2531"/>
+            </a:avLst>
+          </a:prstGeom>
+          <a:solidFill>
+            <a:schemeClr val="accent6">
+              <a:lumMod val="75000"/>
+              <a:alpha val="60000"/>
+            </a:schemeClr>
+          </a:solidFill>
+        </p:spPr>
+        <p:style>
+          <a:lnRef idx="2">
+            <a:schemeClr val="accent1">
+              <a:shade val="50000"/>
+            </a:schemeClr>
+          </a:lnRef>
+          <a:fillRef idx="1">
+            <a:schemeClr val="accent1"/>
+          </a:fillRef>
+          <a:effectRef idx="0">
+            <a:schemeClr val="accent1"/>
+          </a:effectRef>
+          <a:fontRef idx="minor">
+            <a:schemeClr val="lt1"/>
+          </a:fontRef>
+        </p:style>
+        <p:txBody>
+          <a:bodyPr rtlCol="0" anchor="ctr"/>
+          <a:lstStyle/>
+          <a:p>
+            <a:pPr algn="ctr"/>
+            <a:r>
+              <a:rPr lang="en-US" altLang="zh-CN" dirty="0" err="1">
                 <a:solidFill>
                   <a:schemeClr val="bg1"/>
                 </a:solidFill>
-              </a:endParaRPr>
-            </a:p>
-          </p:txBody>
-        </p:sp>
-        <p:sp>
-          <p:nvSpPr>
-            <p:cNvPr id="13" name="Rounded Rectangle 12"/>
-            <p:cNvSpPr/>
-            <p:nvPr/>
-          </p:nvSpPr>
-          <p:spPr>
-            <a:xfrm>
-              <a:off x="2076597" y="6527800"/>
-              <a:ext cx="8596180" cy="252028"/>
-            </a:xfrm>
-            <a:prstGeom prst="roundRect">
-              <a:avLst/>
-            </a:prstGeom>
-            <a:solidFill>
-              <a:srgbClr val="00B050">
-                <a:alpha val="60000"/>
-              </a:srgbClr>
-            </a:solidFill>
-          </p:spPr>
-          <p:style>
-            <a:lnRef idx="2">
-              <a:schemeClr val="accent1">
-                <a:shade val="50000"/>
-              </a:schemeClr>
-            </a:lnRef>
-            <a:fillRef idx="1">
-              <a:schemeClr val="accent1"/>
-            </a:fillRef>
-            <a:effectRef idx="0">
-              <a:schemeClr val="accent1"/>
-            </a:effectRef>
-            <a:fontRef idx="minor">
-              <a:schemeClr val="lt1"/>
-            </a:fontRef>
-          </p:style>
-          <p:txBody>
-            <a:bodyPr rtlCol="0" anchor="ctr"/>
-            <a:lstStyle/>
-            <a:p>
-              <a:pPr algn="ctr"/>
-              <a:r>
-                <a:rPr lang="en-US" dirty="0" err="1">
-                  <a:solidFill>
-                    <a:schemeClr val="bg1"/>
-                  </a:solidFill>
-                </a:rPr>
-                <a:t>StatusBarFooter</a:t>
-              </a:r>
-              <a:endParaRPr lang="en-US" dirty="0">
+              </a:rPr>
+              <a:t>TaskListPanel</a:t>
+            </a:r>
+            <a:endParaRPr lang="en-US" dirty="0">
+              <a:solidFill>
+                <a:schemeClr val="bg1"/>
+              </a:solidFill>
+            </a:endParaRPr>
+          </a:p>
+        </p:txBody>
+      </p:sp>
+      <p:sp>
+        <p:nvSpPr>
+          <p:cNvPr id="13" name="Rounded Rectangle 12"/>
+          <p:cNvSpPr/>
+          <p:nvPr/>
+        </p:nvSpPr>
+        <p:spPr>
+          <a:xfrm>
+            <a:off x="1253525" y="6501603"/>
+            <a:ext cx="9416225" cy="276071"/>
+          </a:xfrm>
+          <a:prstGeom prst="roundRect">
+            <a:avLst/>
+          </a:prstGeom>
+          <a:solidFill>
+            <a:srgbClr val="00B050">
+              <a:alpha val="60000"/>
+            </a:srgbClr>
+          </a:solidFill>
+        </p:spPr>
+        <p:style>
+          <a:lnRef idx="2">
+            <a:schemeClr val="accent1">
+              <a:shade val="50000"/>
+            </a:schemeClr>
+          </a:lnRef>
+          <a:fillRef idx="1">
+            <a:schemeClr val="accent1"/>
+          </a:fillRef>
+          <a:effectRef idx="0">
+            <a:schemeClr val="accent1"/>
+          </a:effectRef>
+          <a:fontRef idx="minor">
+            <a:schemeClr val="lt1"/>
+          </a:fontRef>
+        </p:style>
+        <p:txBody>
+          <a:bodyPr rtlCol="0" anchor="ctr"/>
+          <a:lstStyle/>
+          <a:p>
+            <a:pPr algn="ctr"/>
+            <a:r>
+              <a:rPr lang="en-US" dirty="0" err="1">
                 <a:solidFill>
                   <a:schemeClr val="bg1"/>
                 </a:solidFill>
-              </a:endParaRPr>
-            </a:p>
-          </p:txBody>
-        </p:sp>
-      </p:grpSp>
+              </a:rPr>
+              <a:t>StatusBarFooter</a:t>
+            </a:r>
+            <a:endParaRPr lang="en-US" dirty="0">
+              <a:solidFill>
+                <a:schemeClr val="bg1"/>
+              </a:solidFill>
+            </a:endParaRPr>
+          </a:p>
+        </p:txBody>
+      </p:sp>
     </p:spTree>
     <p:extLst>
       <p:ext uri="{BB962C8B-B14F-4D97-AF65-F5344CB8AC3E}">

</xml_diff>